<commit_message>
Deployed cd3985b with MkDocs version: 1.6.1
</commit_message>
<xml_diff>
--- a/assets/QuarterBackers-AP1.pptx
+++ b/assets/QuarterBackers-AP1.pptx
@@ -275,7 +275,7 @@
           <a:p>
             <a:fld id="{037EA0A6-CB63-4A4D-B151-405007BA7C28}" type="datetimeFigureOut">
               <a:rPr lang="pt-BR" smtClean="0"/>
-              <a:t>03/04/2025</a:t>
+              <a:t>04/04/2025</a:t>
             </a:fld>
             <a:endParaRPr lang="pt-BR"/>
           </a:p>
@@ -473,7 +473,7 @@
           <a:p>
             <a:fld id="{037EA0A6-CB63-4A4D-B151-405007BA7C28}" type="datetimeFigureOut">
               <a:rPr lang="pt-BR" smtClean="0"/>
-              <a:t>03/04/2025</a:t>
+              <a:t>04/04/2025</a:t>
             </a:fld>
             <a:endParaRPr lang="pt-BR"/>
           </a:p>
@@ -681,7 +681,7 @@
           <a:p>
             <a:fld id="{037EA0A6-CB63-4A4D-B151-405007BA7C28}" type="datetimeFigureOut">
               <a:rPr lang="pt-BR" smtClean="0"/>
-              <a:t>03/04/2025</a:t>
+              <a:t>04/04/2025</a:t>
             </a:fld>
             <a:endParaRPr lang="pt-BR"/>
           </a:p>
@@ -879,7 +879,7 @@
           <a:p>
             <a:fld id="{037EA0A6-CB63-4A4D-B151-405007BA7C28}" type="datetimeFigureOut">
               <a:rPr lang="pt-BR" smtClean="0"/>
-              <a:t>03/04/2025</a:t>
+              <a:t>04/04/2025</a:t>
             </a:fld>
             <a:endParaRPr lang="pt-BR"/>
           </a:p>
@@ -1154,7 +1154,7 @@
           <a:p>
             <a:fld id="{037EA0A6-CB63-4A4D-B151-405007BA7C28}" type="datetimeFigureOut">
               <a:rPr lang="pt-BR" smtClean="0"/>
-              <a:t>03/04/2025</a:t>
+              <a:t>04/04/2025</a:t>
             </a:fld>
             <a:endParaRPr lang="pt-BR"/>
           </a:p>
@@ -1419,7 +1419,7 @@
           <a:p>
             <a:fld id="{037EA0A6-CB63-4A4D-B151-405007BA7C28}" type="datetimeFigureOut">
               <a:rPr lang="pt-BR" smtClean="0"/>
-              <a:t>03/04/2025</a:t>
+              <a:t>04/04/2025</a:t>
             </a:fld>
             <a:endParaRPr lang="pt-BR"/>
           </a:p>
@@ -1831,7 +1831,7 @@
           <a:p>
             <a:fld id="{037EA0A6-CB63-4A4D-B151-405007BA7C28}" type="datetimeFigureOut">
               <a:rPr lang="pt-BR" smtClean="0"/>
-              <a:t>03/04/2025</a:t>
+              <a:t>04/04/2025</a:t>
             </a:fld>
             <a:endParaRPr lang="pt-BR"/>
           </a:p>
@@ -1972,7 +1972,7 @@
           <a:p>
             <a:fld id="{037EA0A6-CB63-4A4D-B151-405007BA7C28}" type="datetimeFigureOut">
               <a:rPr lang="pt-BR" smtClean="0"/>
-              <a:t>03/04/2025</a:t>
+              <a:t>04/04/2025</a:t>
             </a:fld>
             <a:endParaRPr lang="pt-BR"/>
           </a:p>
@@ -2085,7 +2085,7 @@
           <a:p>
             <a:fld id="{037EA0A6-CB63-4A4D-B151-405007BA7C28}" type="datetimeFigureOut">
               <a:rPr lang="pt-BR" smtClean="0"/>
-              <a:t>03/04/2025</a:t>
+              <a:t>04/04/2025</a:t>
             </a:fld>
             <a:endParaRPr lang="pt-BR"/>
           </a:p>
@@ -2396,7 +2396,7 @@
           <a:p>
             <a:fld id="{037EA0A6-CB63-4A4D-B151-405007BA7C28}" type="datetimeFigureOut">
               <a:rPr lang="pt-BR" smtClean="0"/>
-              <a:t>03/04/2025</a:t>
+              <a:t>04/04/2025</a:t>
             </a:fld>
             <a:endParaRPr lang="pt-BR"/>
           </a:p>
@@ -2684,7 +2684,7 @@
           <a:p>
             <a:fld id="{037EA0A6-CB63-4A4D-B151-405007BA7C28}" type="datetimeFigureOut">
               <a:rPr lang="pt-BR" smtClean="0"/>
-              <a:t>03/04/2025</a:t>
+              <a:t>04/04/2025</a:t>
             </a:fld>
             <a:endParaRPr lang="pt-BR"/>
           </a:p>
@@ -2925,7 +2925,7 @@
           <a:p>
             <a:fld id="{037EA0A6-CB63-4A4D-B151-405007BA7C28}" type="datetimeFigureOut">
               <a:rPr lang="pt-BR" smtClean="0"/>
-              <a:t>03/04/2025</a:t>
+              <a:t>04/04/2025</a:t>
             </a:fld>
             <a:endParaRPr lang="pt-BR"/>
           </a:p>
@@ -4048,8 +4048,8 @@
         </p:nvSpPr>
         <p:spPr>
           <a:xfrm>
-            <a:off x="1118647" y="2403837"/>
-            <a:ext cx="4094375" cy="1754326"/>
+            <a:off x="619027" y="2690335"/>
+            <a:ext cx="2508278" cy="1477328"/>
           </a:xfrm>
           <a:prstGeom prst="rect">
             <a:avLst/>
@@ -4070,7 +4070,7 @@
                 </a:solidFill>
                 <a:latin typeface="+mj-lt"/>
               </a:rPr>
-              <a:t>Primeiramente</a:t>
+              <a:t>Ademais,</a:t>
             </a:r>
             <a:r>
               <a:rPr lang="pt-BR" dirty="0">
@@ -4079,7 +4079,7 @@
                 </a:solidFill>
                 <a:latin typeface="+mj-lt"/>
               </a:rPr>
-              <a:t>, trabalhamos estudando os dados comumente coletados em um censo demográfico do IBGE. No entanto, selecionamos aqueles que consideramos </a:t>
+              <a:t> nos reunimos para expor nossas visões e entendimentos a respeito do projeto em um </a:t>
             </a:r>
             <a:r>
               <a:rPr lang="pt-BR" b="1" dirty="0">
@@ -4088,103 +4088,41 @@
                 </a:solidFill>
                 <a:latin typeface="+mj-lt"/>
               </a:rPr>
-              <a:t>relevantes</a:t>
-            </a:r>
-            <a:r>
-              <a:rPr lang="pt-BR" dirty="0">
-                <a:solidFill>
-                  <a:schemeClr val="bg1"/>
-                </a:solidFill>
-                <a:latin typeface="+mj-lt"/>
-              </a:rPr>
-              <a:t> </a:t>
-            </a:r>
-            <a:r>
-              <a:rPr lang="pt-BR" b="1" dirty="0">
-                <a:solidFill>
-                  <a:schemeClr val="bg1"/>
-                </a:solidFill>
-                <a:latin typeface="+mj-lt"/>
-              </a:rPr>
-              <a:t>para atender as demandas da Ilha Primeira.</a:t>
-            </a:r>
-          </a:p>
-        </p:txBody>
-      </p:sp>
-      <p:sp>
-        <p:nvSpPr>
-          <p:cNvPr id="11" name="CaixaDeTexto 10">
-            <a:extLst>
-              <a:ext uri="{FF2B5EF4-FFF2-40B4-BE49-F238E27FC236}">
-                <a16:creationId xmlns:a16="http://schemas.microsoft.com/office/drawing/2014/main" id="{5A083CF0-3506-C7C8-B272-67F8984830C7}"/>
-              </a:ext>
-            </a:extLst>
-          </p:cNvPr>
-          <p:cNvSpPr txBox="1"/>
+              <a:t>brainstorm.</a:t>
+            </a:r>
+          </a:p>
+        </p:txBody>
+      </p:sp>
+      <p:pic>
+        <p:nvPicPr>
+          <p:cNvPr id="3" name="Imagem 2">
+            <a:extLst>
+              <a:ext uri="{FF2B5EF4-FFF2-40B4-BE49-F238E27FC236}">
+                <a16:creationId xmlns:a16="http://schemas.microsoft.com/office/drawing/2014/main" id="{70ECD461-7804-B69A-639A-9DB17A608411}"/>
+              </a:ext>
+            </a:extLst>
+          </p:cNvPr>
+          <p:cNvPicPr>
+            <a:picLocks noChangeAspect="1"/>
+          </p:cNvPicPr>
           <p:nvPr/>
-        </p:nvSpPr>
+        </p:nvPicPr>
+        <p:blipFill>
+          <a:blip r:embed="rId2"/>
+          <a:stretch>
+            <a:fillRect/>
+          </a:stretch>
+        </p:blipFill>
         <p:spPr>
           <a:xfrm>
-            <a:off x="6978978" y="2403837"/>
-            <a:ext cx="4094375" cy="1754326"/>
+            <a:off x="3565959" y="2273581"/>
+            <a:ext cx="8007014" cy="2310836"/>
           </a:xfrm>
           <a:prstGeom prst="rect">
             <a:avLst/>
           </a:prstGeom>
-          <a:noFill/>
         </p:spPr>
-        <p:txBody>
-          <a:bodyPr wrap="square" rtlCol="0">
-            <a:spAutoFit/>
-          </a:bodyPr>
-          <a:lstStyle/>
-          <a:p>
-            <a:pPr algn="just"/>
-            <a:r>
-              <a:rPr lang="pt-BR" dirty="0">
-                <a:solidFill>
-                  <a:schemeClr val="bg1"/>
-                </a:solidFill>
-                <a:latin typeface="+mj-lt"/>
-              </a:rPr>
-              <a:t>Selecionamos dados de diversas áreas, tais como:</a:t>
-            </a:r>
-            <a:r>
-              <a:rPr lang="pt-BR" b="1" dirty="0">
-                <a:solidFill>
-                  <a:schemeClr val="bg1"/>
-                </a:solidFill>
-                <a:latin typeface="+mj-lt"/>
-              </a:rPr>
-              <a:t> Crescimento Populacional</a:t>
-            </a:r>
-            <a:r>
-              <a:rPr lang="pt-BR" dirty="0">
-                <a:solidFill>
-                  <a:schemeClr val="bg1"/>
-                </a:solidFill>
-                <a:latin typeface="+mj-lt"/>
-              </a:rPr>
-              <a:t>, </a:t>
-            </a:r>
-            <a:r>
-              <a:rPr lang="pt-BR" b="1" dirty="0">
-                <a:solidFill>
-                  <a:schemeClr val="bg1"/>
-                </a:solidFill>
-                <a:latin typeface="+mj-lt"/>
-              </a:rPr>
-              <a:t>Território, Pirâmide Etária, Cor ou Raça, Sexo, Alfabetização, Características dos Domicílios, Nível de Instrução e Composição Alimentar</a:t>
-            </a:r>
-            <a:endParaRPr lang="pt-BR" dirty="0">
-              <a:solidFill>
-                <a:schemeClr val="bg1"/>
-              </a:solidFill>
-              <a:latin typeface="+mj-lt"/>
-            </a:endParaRPr>
-          </a:p>
-        </p:txBody>
-      </p:sp>
+      </p:pic>
     </p:spTree>
     <p:extLst>
       <p:ext uri="{BB962C8B-B14F-4D97-AF65-F5344CB8AC3E}">
@@ -4699,6 +4637,186 @@
                 <a:cs typeface="Aharoni" panose="02010803020104030203" pitchFamily="2" charset="-79"/>
               </a:rPr>
               <a:t>Protótipo</a:t>
+            </a:r>
+          </a:p>
+        </p:txBody>
+      </p:sp>
+      <p:sp>
+        <p:nvSpPr>
+          <p:cNvPr id="2" name="CaixaDeTexto 1">
+            <a:extLst>
+              <a:ext uri="{FF2B5EF4-FFF2-40B4-BE49-F238E27FC236}">
+                <a16:creationId xmlns:a16="http://schemas.microsoft.com/office/drawing/2014/main" id="{2108681D-AD16-5470-6B19-720D92BBC121}"/>
+              </a:ext>
+            </a:extLst>
+          </p:cNvPr>
+          <p:cNvSpPr txBox="1"/>
+          <p:nvPr/>
+        </p:nvSpPr>
+        <p:spPr>
+          <a:xfrm>
+            <a:off x="633167" y="2767094"/>
+            <a:ext cx="10925666" cy="338554"/>
+          </a:xfrm>
+          <a:prstGeom prst="rect">
+            <a:avLst/>
+          </a:prstGeom>
+          <a:noFill/>
+        </p:spPr>
+        <p:txBody>
+          <a:bodyPr wrap="square" rtlCol="0">
+            <a:spAutoFit/>
+          </a:bodyPr>
+          <a:lstStyle/>
+          <a:p>
+            <a:r>
+              <a:rPr lang="pt-BR" sz="1600" dirty="0">
+                <a:solidFill>
+                  <a:schemeClr val="bg1"/>
+                </a:solidFill>
+                <a:hlinkClick r:id="rId2">
+                  <a:extLst>
+                    <a:ext uri="{A12FA001-AC4F-418D-AE19-62706E023703}">
+                      <ahyp:hlinkClr xmlns:ahyp="http://schemas.microsoft.com/office/drawing/2018/hyperlinkcolor" val="tx"/>
+                    </a:ext>
+                  </a:extLst>
+                </a:hlinkClick>
+              </a:rPr>
+              <a:t>https://www.figma.com/design/z0PSxTKRSgJN6j0BhZHGOa/Projeto-Back-End?node-id=0-1&amp;p=f&amp;t=F9J92RAHO8hEmxp0-0</a:t>
+            </a:r>
+            <a:endParaRPr lang="pt-BR" sz="1600" dirty="0">
+              <a:solidFill>
+                <a:schemeClr val="bg1"/>
+              </a:solidFill>
+            </a:endParaRPr>
+          </a:p>
+        </p:txBody>
+      </p:sp>
+      <p:sp>
+        <p:nvSpPr>
+          <p:cNvPr id="3" name="CaixaDeTexto 2">
+            <a:extLst>
+              <a:ext uri="{FF2B5EF4-FFF2-40B4-BE49-F238E27FC236}">
+                <a16:creationId xmlns:a16="http://schemas.microsoft.com/office/drawing/2014/main" id="{6AE29CCE-C598-B013-F728-54130E530B89}"/>
+              </a:ext>
+            </a:extLst>
+          </p:cNvPr>
+          <p:cNvSpPr txBox="1"/>
+          <p:nvPr/>
+        </p:nvSpPr>
+        <p:spPr>
+          <a:xfrm>
+            <a:off x="534971" y="3752353"/>
+            <a:ext cx="11122058" cy="338554"/>
+          </a:xfrm>
+          <a:prstGeom prst="rect">
+            <a:avLst/>
+          </a:prstGeom>
+          <a:noFill/>
+        </p:spPr>
+        <p:txBody>
+          <a:bodyPr wrap="square" rtlCol="0">
+            <a:spAutoFit/>
+          </a:bodyPr>
+          <a:lstStyle/>
+          <a:p>
+            <a:r>
+              <a:rPr lang="pt-BR" sz="1600" dirty="0">
+                <a:solidFill>
+                  <a:schemeClr val="bg1"/>
+                </a:solidFill>
+                <a:hlinkClick r:id="rId3">
+                  <a:extLst>
+                    <a:ext uri="{A12FA001-AC4F-418D-AE19-62706E023703}">
+                      <ahyp:hlinkClr xmlns:ahyp="http://schemas.microsoft.com/office/drawing/2018/hyperlinkcolor" val="tx"/>
+                    </a:ext>
+                  </a:extLst>
+                </a:hlinkClick>
+              </a:rPr>
+              <a:t>https://www.figma.com/design/d5DpfbadXrv9LtwibJ6BIb/Projeto-Back-End--Copy-?node-id=0-1&amp;p=f&amp;t=AxvK2CIriyueZKKC-0</a:t>
+            </a:r>
+            <a:endParaRPr lang="pt-BR" sz="1600" dirty="0">
+              <a:solidFill>
+                <a:schemeClr val="bg1"/>
+              </a:solidFill>
+            </a:endParaRPr>
+          </a:p>
+        </p:txBody>
+      </p:sp>
+      <p:sp>
+        <p:nvSpPr>
+          <p:cNvPr id="5" name="CaixaDeTexto 4">
+            <a:extLst>
+              <a:ext uri="{FF2B5EF4-FFF2-40B4-BE49-F238E27FC236}">
+                <a16:creationId xmlns:a16="http://schemas.microsoft.com/office/drawing/2014/main" id="{239FC5B5-FB68-5E7B-DF8B-B3DBC98FCCE5}"/>
+              </a:ext>
+            </a:extLst>
+          </p:cNvPr>
+          <p:cNvSpPr txBox="1"/>
+          <p:nvPr/>
+        </p:nvSpPr>
+        <p:spPr>
+          <a:xfrm>
+            <a:off x="633167" y="2397762"/>
+            <a:ext cx="1261888" cy="369332"/>
+          </a:xfrm>
+          <a:prstGeom prst="rect">
+            <a:avLst/>
+          </a:prstGeom>
+          <a:noFill/>
+        </p:spPr>
+        <p:txBody>
+          <a:bodyPr wrap="square" rtlCol="0">
+            <a:spAutoFit/>
+          </a:bodyPr>
+          <a:lstStyle/>
+          <a:p>
+            <a:r>
+              <a:rPr lang="pt-BR" b="1" dirty="0">
+                <a:solidFill>
+                  <a:schemeClr val="bg1"/>
+                </a:solidFill>
+              </a:rPr>
+              <a:t>USUÁRIO:</a:t>
+            </a:r>
+          </a:p>
+        </p:txBody>
+      </p:sp>
+      <p:sp>
+        <p:nvSpPr>
+          <p:cNvPr id="6" name="CaixaDeTexto 5">
+            <a:extLst>
+              <a:ext uri="{FF2B5EF4-FFF2-40B4-BE49-F238E27FC236}">
+                <a16:creationId xmlns:a16="http://schemas.microsoft.com/office/drawing/2014/main" id="{749E0647-791D-36F4-D46F-EB7D900376D1}"/>
+              </a:ext>
+            </a:extLst>
+          </p:cNvPr>
+          <p:cNvSpPr txBox="1"/>
+          <p:nvPr/>
+        </p:nvSpPr>
+        <p:spPr>
+          <a:xfrm>
+            <a:off x="534970" y="3429000"/>
+            <a:ext cx="3200267" cy="369332"/>
+          </a:xfrm>
+          <a:prstGeom prst="rect">
+            <a:avLst/>
+          </a:prstGeom>
+          <a:noFill/>
+        </p:spPr>
+        <p:txBody>
+          <a:bodyPr wrap="square" rtlCol="0">
+            <a:spAutoFit/>
+          </a:bodyPr>
+          <a:lstStyle/>
+          <a:p>
+            <a:r>
+              <a:rPr lang="pt-BR" b="1" dirty="0">
+                <a:solidFill>
+                  <a:schemeClr val="bg1"/>
+                </a:solidFill>
+              </a:rPr>
+              <a:t>ADM E RECENSEADOR:</a:t>
             </a:r>
           </a:p>
         </p:txBody>

</xml_diff>